<commit_message>
Update Entity Relationship Model.pptx
</commit_message>
<xml_diff>
--- a/Part 2 - Database Design/powerpoint/Entity Relationship Model.pptx
+++ b/Part 2 - Database Design/powerpoint/Entity Relationship Model.pptx
@@ -1766,8 +1766,8 @@
     <dgm:cxn modelId="{5C126895-E4A7-45B4-B30C-6B1F68A5ECFA}" srcId="{8F4506F1-B9B9-40CA-A87A-9240ED753B10}" destId="{5564CB62-2849-4781-A245-8F63F15441FE}" srcOrd="0" destOrd="0" parTransId="{1CB8DB16-D02F-4C7D-A37A-1CDD44B5EB88}" sibTransId="{CADD2384-BA99-4CD2-8A30-E171C267E28E}"/>
     <dgm:cxn modelId="{EAA242A0-75AE-45A1-BE5A-232683246431}" srcId="{69D17226-F5A9-48A9-91B3-D349E4C8E5FE}" destId="{4DE0BF30-18C5-4036-8B91-D147CE47473C}" srcOrd="2" destOrd="0" parTransId="{674E0CC1-4680-4515-A876-226E0ACD04A8}" sibTransId="{700D0C89-0988-4F13-9AD2-C7054AF00A77}"/>
     <dgm:cxn modelId="{61AE78A4-35EC-4428-B86E-8FFC5D60088D}" srcId="{AC6BD12B-5D89-4EFC-8AE3-7B47E9D560E3}" destId="{408D8E0E-59CC-4AB3-8872-E2FB03320A30}" srcOrd="0" destOrd="0" parTransId="{3CD4B8DE-C028-4503-9052-D7DC0A1E6B1D}" sibTransId="{18272BC3-8212-4F51-8224-4377F9C90574}"/>
+    <dgm:cxn modelId="{35854CA8-A679-4967-AA70-B5DF5D0AD7FB}" type="presOf" srcId="{62111D20-1615-4496-84CA-F8CDB95DC4A0}" destId="{44CF4554-AB16-463D-9B7D-6AC967BD5EEF}" srcOrd="0" destOrd="2" presId="urn:microsoft.com/office/officeart/2005/8/layout/process3"/>
     <dgm:cxn modelId="{0DE263A8-F96C-4C3B-8D89-8BF8B0D7C6EE}" type="presOf" srcId="{5564CB62-2849-4781-A245-8F63F15441FE}" destId="{5EA91344-8B93-4C14-9F21-79F977633B9C}" srcOrd="0" destOrd="0" presId="urn:microsoft.com/office/officeart/2005/8/layout/process3"/>
-    <dgm:cxn modelId="{35854CA8-A679-4967-AA70-B5DF5D0AD7FB}" type="presOf" srcId="{62111D20-1615-4496-84CA-F8CDB95DC4A0}" destId="{44CF4554-AB16-463D-9B7D-6AC967BD5EEF}" srcOrd="0" destOrd="2" presId="urn:microsoft.com/office/officeart/2005/8/layout/process3"/>
     <dgm:cxn modelId="{0BA9EFAE-A894-46FB-9792-5DFE30831CEA}" type="presOf" srcId="{5E13D189-DFAD-4E20-B27F-BF51B8675207}" destId="{4D1C11EB-545F-40BE-AA50-83D10F9CDC7F}" srcOrd="1" destOrd="0" presId="urn:microsoft.com/office/officeart/2005/8/layout/process3"/>
     <dgm:cxn modelId="{7CA859B0-5A16-4B2B-AE7C-D8F23169D24E}" srcId="{5E13D189-DFAD-4E20-B27F-BF51B8675207}" destId="{288FC1F2-41B7-45FF-8CB0-224AB00AEDB9}" srcOrd="1" destOrd="0" parTransId="{955D7606-FB30-4777-894B-5E86968DDDE4}" sibTransId="{E9153232-373E-4709-9772-C58D5FFF5A69}"/>
     <dgm:cxn modelId="{1247B7C1-D2E2-44AC-A49D-F710B842E7CE}" type="presOf" srcId="{5C546EA2-BD25-43AA-8A95-4878D6CC353F}" destId="{8726F96F-4A63-4CBB-873C-95618A099C69}" srcOrd="0" destOrd="0" presId="urn:microsoft.com/office/officeart/2005/8/layout/process3"/>
@@ -4225,7 +4225,7 @@
           <a:p>
             <a:fld id="{F666E1FD-E7A0-497B-BBC0-740BAAC97C64}" type="datetimeFigureOut">
               <a:rPr lang="en-PH" smtClean="0"/>
-              <a:t>25/01/2024</a:t>
+              <a:t>1/25/24</a:t>
             </a:fld>
             <a:endParaRPr lang="en-PH"/>
           </a:p>
@@ -4642,7 +4642,7 @@
           <a:p>
             <a:fld id="{0CCF0B81-6BD8-4C65-9459-815598C5F1F4}" type="datetimeFigureOut">
               <a:rPr lang="en-PH" smtClean="0"/>
-              <a:t>25/01/2024</a:t>
+              <a:t>1/25/24</a:t>
             </a:fld>
             <a:endParaRPr lang="en-PH"/>
           </a:p>
@@ -4842,7 +4842,7 @@
           <a:p>
             <a:fld id="{0CCF0B81-6BD8-4C65-9459-815598C5F1F4}" type="datetimeFigureOut">
               <a:rPr lang="en-PH" smtClean="0"/>
-              <a:t>25/01/2024</a:t>
+              <a:t>1/25/24</a:t>
             </a:fld>
             <a:endParaRPr lang="en-PH"/>
           </a:p>
@@ -5052,7 +5052,7 @@
           <a:p>
             <a:fld id="{0CCF0B81-6BD8-4C65-9459-815598C5F1F4}" type="datetimeFigureOut">
               <a:rPr lang="en-PH" smtClean="0"/>
-              <a:t>25/01/2024</a:t>
+              <a:t>1/25/24</a:t>
             </a:fld>
             <a:endParaRPr lang="en-PH"/>
           </a:p>
@@ -5252,7 +5252,7 @@
           <a:p>
             <a:fld id="{0CCF0B81-6BD8-4C65-9459-815598C5F1F4}" type="datetimeFigureOut">
               <a:rPr lang="en-PH" smtClean="0"/>
-              <a:t>25/01/2024</a:t>
+              <a:t>1/25/24</a:t>
             </a:fld>
             <a:endParaRPr lang="en-PH"/>
           </a:p>
@@ -5528,7 +5528,7 @@
           <a:p>
             <a:fld id="{0CCF0B81-6BD8-4C65-9459-815598C5F1F4}" type="datetimeFigureOut">
               <a:rPr lang="en-PH" smtClean="0"/>
-              <a:t>25/01/2024</a:t>
+              <a:t>1/25/24</a:t>
             </a:fld>
             <a:endParaRPr lang="en-PH"/>
           </a:p>
@@ -5796,7 +5796,7 @@
           <a:p>
             <a:fld id="{0CCF0B81-6BD8-4C65-9459-815598C5F1F4}" type="datetimeFigureOut">
               <a:rPr lang="en-PH" smtClean="0"/>
-              <a:t>25/01/2024</a:t>
+              <a:t>1/25/24</a:t>
             </a:fld>
             <a:endParaRPr lang="en-PH"/>
           </a:p>
@@ -6211,7 +6211,7 @@
           <a:p>
             <a:fld id="{0CCF0B81-6BD8-4C65-9459-815598C5F1F4}" type="datetimeFigureOut">
               <a:rPr lang="en-PH" smtClean="0"/>
-              <a:t>25/01/2024</a:t>
+              <a:t>1/25/24</a:t>
             </a:fld>
             <a:endParaRPr lang="en-PH"/>
           </a:p>
@@ -6353,7 +6353,7 @@
           <a:p>
             <a:fld id="{0CCF0B81-6BD8-4C65-9459-815598C5F1F4}" type="datetimeFigureOut">
               <a:rPr lang="en-PH" smtClean="0"/>
-              <a:t>25/01/2024</a:t>
+              <a:t>1/25/24</a:t>
             </a:fld>
             <a:endParaRPr lang="en-PH"/>
           </a:p>
@@ -6466,7 +6466,7 @@
           <a:p>
             <a:fld id="{0CCF0B81-6BD8-4C65-9459-815598C5F1F4}" type="datetimeFigureOut">
               <a:rPr lang="en-PH" smtClean="0"/>
-              <a:t>25/01/2024</a:t>
+              <a:t>1/25/24</a:t>
             </a:fld>
             <a:endParaRPr lang="en-PH"/>
           </a:p>
@@ -6779,7 +6779,7 @@
           <a:p>
             <a:fld id="{0CCF0B81-6BD8-4C65-9459-815598C5F1F4}" type="datetimeFigureOut">
               <a:rPr lang="en-PH" smtClean="0"/>
-              <a:t>25/01/2024</a:t>
+              <a:t>1/25/24</a:t>
             </a:fld>
             <a:endParaRPr lang="en-PH"/>
           </a:p>
@@ -7068,7 +7068,7 @@
           <a:p>
             <a:fld id="{0CCF0B81-6BD8-4C65-9459-815598C5F1F4}" type="datetimeFigureOut">
               <a:rPr lang="en-PH" smtClean="0"/>
-              <a:t>25/01/2024</a:t>
+              <a:t>1/25/24</a:t>
             </a:fld>
             <a:endParaRPr lang="en-PH"/>
           </a:p>
@@ -7311,7 +7311,7 @@
           <a:p>
             <a:fld id="{0CCF0B81-6BD8-4C65-9459-815598C5F1F4}" type="datetimeFigureOut">
               <a:rPr lang="en-PH" smtClean="0"/>
-              <a:t>25/01/2024</a:t>
+              <a:t>1/25/24</a:t>
             </a:fld>
             <a:endParaRPr lang="en-PH"/>
           </a:p>
@@ -11243,7 +11243,7 @@
         </p:blipFill>
         <p:spPr>
           <a:xfrm>
-            <a:off x="5997195" y="1270274"/>
+            <a:off x="5870195" y="1305083"/>
             <a:ext cx="597907" cy="597907"/>
           </a:xfrm>
           <a:prstGeom prst="rect">
@@ -11282,7 +11282,7 @@
         </p:blipFill>
         <p:spPr>
           <a:xfrm>
-            <a:off x="5997195" y="1920865"/>
+            <a:off x="6234262" y="1937798"/>
             <a:ext cx="597907" cy="597907"/>
           </a:xfrm>
           <a:prstGeom prst="rect">
@@ -12188,7 +12188,7 @@
         </p:blipFill>
         <p:spPr>
           <a:xfrm>
-            <a:off x="6095999" y="989041"/>
+            <a:off x="6285512" y="1001594"/>
             <a:ext cx="597907" cy="597907"/>
           </a:xfrm>
           <a:prstGeom prst="rect">
@@ -12227,7 +12227,7 @@
         </p:blipFill>
         <p:spPr>
           <a:xfrm>
-            <a:off x="6279666" y="1690611"/>
+            <a:off x="6584466" y="1673677"/>
             <a:ext cx="597907" cy="597907"/>
           </a:xfrm>
           <a:prstGeom prst="rect">
@@ -12266,7 +12266,7 @@
         </p:blipFill>
         <p:spPr>
           <a:xfrm>
-            <a:off x="5372623" y="2341201"/>
+            <a:off x="5431890" y="2349667"/>
             <a:ext cx="597907" cy="597907"/>
           </a:xfrm>
           <a:prstGeom prst="rect">
@@ -15624,7 +15624,7 @@
         </p:blipFill>
         <p:spPr>
           <a:xfrm>
-            <a:off x="6380822" y="1699096"/>
+            <a:off x="6575555" y="1690629"/>
             <a:ext cx="597907" cy="597907"/>
           </a:xfrm>
           <a:prstGeom prst="rect">
@@ -18790,7 +18790,7 @@
         </p:blipFill>
         <p:spPr>
           <a:xfrm>
-            <a:off x="5913906" y="2031146"/>
+            <a:off x="6184839" y="1947996"/>
             <a:ext cx="597907" cy="597907"/>
           </a:xfrm>
           <a:prstGeom prst="rect">
@@ -18829,7 +18829,7 @@
         </p:blipFill>
         <p:spPr>
           <a:xfrm>
-            <a:off x="5002758" y="2545903"/>
+            <a:off x="5136995" y="2545903"/>
             <a:ext cx="597907" cy="597907"/>
           </a:xfrm>
           <a:prstGeom prst="rect">

</xml_diff>